<commit_message>
added improving header sides
</commit_message>
<xml_diff>
--- a/talks/houston/2020 Houston Techfest Speaker promo slides.pptx
+++ b/talks/houston/2020 Houston Techfest Speaker promo slides.pptx
@@ -7901,7 +7901,10 @@
           <a:bodyPr/>
           <a:lstStyle/>
           <a:p>
-            <a:endParaRPr lang="en-US" dirty="0"/>
+            <a:r>
+              <a:rPr lang="en-US" dirty="0"/>
+              <a:t>Harold Pulcher</a:t>
+            </a:r>
           </a:p>
         </p:txBody>
       </p:sp>
@@ -7926,6 +7929,14 @@
           <a:bodyPr/>
           <a:lstStyle/>
           <a:p>
+            <a:r>
+              <a:rPr lang="en-US" dirty="0"/>
+              <a:t>Senior Consultant </a:t>
+            </a:r>
+            <a:r>
+              <a:rPr lang="en-US"/>
+              <a:t>and Microsoft MVP</a:t>
+            </a:r>
             <a:endParaRPr lang="en-US" dirty="0"/>
           </a:p>
         </p:txBody>
@@ -12392,21 +12403,6 @@
 </file>
 
 <file path=customXml/item1.xml><?xml version="1.0" encoding="utf-8"?>
-<p:properties xmlns:p="http://schemas.microsoft.com/office/2006/metadata/properties" xmlns:xsi="http://www.w3.org/2001/XMLSchema-instance" xmlns:pc="http://schemas.microsoft.com/office/infopath/2007/PartnerControls">
-  <documentManagement/>
-</p:properties>
-</file>
-
-<file path=customXml/item2.xml><?xml version="1.0" encoding="utf-8"?>
-<?mso-contentType ?>
-<FormTemplates xmlns="http://schemas.microsoft.com/sharepoint/v3/contenttype/forms">
-  <Display>DocumentLibraryForm</Display>
-  <Edit>DocumentLibraryForm</Edit>
-  <New>DocumentLibraryForm</New>
-</FormTemplates>
-</file>
-
-<file path=customXml/item3.xml><?xml version="1.0" encoding="utf-8"?>
 <ct:contentTypeSchema xmlns:ct="http://schemas.microsoft.com/office/2006/metadata/contentType" xmlns:ma="http://schemas.microsoft.com/office/2006/metadata/properties/metaAttributes" ct:_="" ma:_="" ma:contentTypeName="Document" ma:contentTypeID="0x01010078DAFA15693CA54D9F222E3753DD946D" ma:contentTypeVersion="8" ma:contentTypeDescription="Create a new document." ma:contentTypeScope="" ma:versionID="6ac43d13ff4539272863e612e3e44eec">
   <xsd:schema xmlns:xsd="http://www.w3.org/2001/XMLSchema" xmlns:xs="http://www.w3.org/2001/XMLSchema" xmlns:p="http://schemas.microsoft.com/office/2006/metadata/properties" xmlns:ns2="0858d84d-9456-4673-b11a-a5b5c65a976f" targetNamespace="http://schemas.microsoft.com/office/2006/metadata/properties" ma:root="true" ma:fieldsID="e55b6d9317976980d940ba9d560b4b00" ns2:_="">
     <xsd:import namespace="0858d84d-9456-4673-b11a-a5b5c65a976f"/>
@@ -12576,31 +12572,22 @@
 </ct:contentTypeSchema>
 </file>
 
-<file path=customXml/itemProps1.xml><?xml version="1.0" encoding="utf-8"?>
-<ds:datastoreItem xmlns:ds="http://schemas.openxmlformats.org/officeDocument/2006/customXml" ds:itemID="{C992E7E6-9DCB-4E04-A270-2C9E3C545C85}">
-  <ds:schemaRefs>
-    <ds:schemaRef ds:uri="http://schemas.microsoft.com/office/2006/metadata/properties"/>
-    <ds:schemaRef ds:uri="http://schemas.openxmlformats.org/package/2006/metadata/core-properties"/>
-    <ds:schemaRef ds:uri="http://schemas.microsoft.com/office/2006/documentManagement/types"/>
-    <ds:schemaRef ds:uri="0858d84d-9456-4673-b11a-a5b5c65a976f"/>
-    <ds:schemaRef ds:uri="http://purl.org/dc/terms/"/>
-    <ds:schemaRef ds:uri="http://schemas.microsoft.com/office/infopath/2007/PartnerControls"/>
-    <ds:schemaRef ds:uri="http://purl.org/dc/dcmitype/"/>
-    <ds:schemaRef ds:uri="http://www.w3.org/XML/1998/namespace"/>
-    <ds:schemaRef ds:uri="http://purl.org/dc/elements/1.1/"/>
-  </ds:schemaRefs>
-</ds:datastoreItem>
+<file path=customXml/item2.xml><?xml version="1.0" encoding="utf-8"?>
+<?mso-contentType ?>
+<FormTemplates xmlns="http://schemas.microsoft.com/sharepoint/v3/contenttype/forms">
+  <Display>DocumentLibraryForm</Display>
+  <Edit>DocumentLibraryForm</Edit>
+  <New>DocumentLibraryForm</New>
+</FormTemplates>
 </file>
 
-<file path=customXml/itemProps2.xml><?xml version="1.0" encoding="utf-8"?>
-<ds:datastoreItem xmlns:ds="http://schemas.openxmlformats.org/officeDocument/2006/customXml" ds:itemID="{39A6EC3F-A396-4D70-A10D-8F9116CDFDAE}">
-  <ds:schemaRefs>
-    <ds:schemaRef ds:uri="http://schemas.microsoft.com/sharepoint/v3/contenttype/forms"/>
-  </ds:schemaRefs>
-</ds:datastoreItem>
+<file path=customXml/item3.xml><?xml version="1.0" encoding="utf-8"?>
+<p:properties xmlns:p="http://schemas.microsoft.com/office/2006/metadata/properties" xmlns:xsi="http://www.w3.org/2001/XMLSchema-instance" xmlns:pc="http://schemas.microsoft.com/office/infopath/2007/PartnerControls">
+  <documentManagement/>
+</p:properties>
 </file>
 
-<file path=customXml/itemProps3.xml><?xml version="1.0" encoding="utf-8"?>
+<file path=customXml/itemProps1.xml><?xml version="1.0" encoding="utf-8"?>
 <ds:datastoreItem xmlns:ds="http://schemas.openxmlformats.org/officeDocument/2006/customXml" ds:itemID="{0E97EA0C-840A-4D62-B846-B444E2EF3B44}">
   <ds:schemaRefs>
     <ds:schemaRef ds:uri="http://schemas.microsoft.com/office/2006/metadata/contentType"/>
@@ -12616,4 +12603,28 @@
     <ds:schemaRef ds:uri="http://schemas.microsoft.com/internal/obd"/>
   </ds:schemaRefs>
 </ds:datastoreItem>
+</file>
+
+<file path=customXml/itemProps2.xml><?xml version="1.0" encoding="utf-8"?>
+<ds:datastoreItem xmlns:ds="http://schemas.openxmlformats.org/officeDocument/2006/customXml" ds:itemID="{39A6EC3F-A396-4D70-A10D-8F9116CDFDAE}">
+  <ds:schemaRefs>
+    <ds:schemaRef ds:uri="http://schemas.microsoft.com/sharepoint/v3/contenttype/forms"/>
+  </ds:schemaRefs>
+</ds:datastoreItem>
+</file>
+
+<file path=customXml/itemProps3.xml><?xml version="1.0" encoding="utf-8"?>
+<ds:datastoreItem xmlns:ds="http://schemas.openxmlformats.org/officeDocument/2006/customXml" ds:itemID="{C992E7E6-9DCB-4E04-A270-2C9E3C545C85}">
+  <ds:schemaRefs>
+    <ds:schemaRef ds:uri="http://schemas.microsoft.com/office/2006/metadata/properties"/>
+    <ds:schemaRef ds:uri="http://schemas.openxmlformats.org/package/2006/metadata/core-properties"/>
+    <ds:schemaRef ds:uri="http://schemas.microsoft.com/office/2006/documentManagement/types"/>
+    <ds:schemaRef ds:uri="0858d84d-9456-4673-b11a-a5b5c65a976f"/>
+    <ds:schemaRef ds:uri="http://purl.org/dc/terms/"/>
+    <ds:schemaRef ds:uri="http://schemas.microsoft.com/office/infopath/2007/PartnerControls"/>
+    <ds:schemaRef ds:uri="http://purl.org/dc/dcmitype/"/>
+    <ds:schemaRef ds:uri="http://www.w3.org/XML/1998/namespace"/>
+    <ds:schemaRef ds:uri="http://purl.org/dc/elements/1.1/"/>
+  </ds:schemaRefs>
+</ds:datastoreItem>
 </file>
</xml_diff>